<commit_message>
fixed the code box slide template
</commit_message>
<xml_diff>
--- a/Document-Templates/SoftUni-International-PowerPoint-Template-July-2020.pptx
+++ b/Document-Templates/SoftUni-International-PowerPoint-Template-July-2020.pptx
@@ -301,7 +301,7 @@
           <a:p>
             <a:fld id="{4E087215-0C8F-4762-A664-737A353EC9A4}" type="datetimeFigureOut">
               <a:rPr lang="bg-BG" smtClean="0"/>
-              <a:t>20.7.2020 г.</a:t>
+              <a:t>21.10.2020 г.</a:t>
             </a:fld>
             <a:endParaRPr lang="bg-BG"/>
           </a:p>
@@ -492,7 +492,7 @@
           <a:p>
             <a:fld id="{72D84649-876A-46C9-8472-14CB09C070D8}" type="datetimeFigureOut">
               <a:rPr lang="en-US" smtClean="0"/>
-              <a:t>20-Jul-20</a:t>
+              <a:t>21-Oct-20</a:t>
             </a:fld>
             <a:endParaRPr lang="en-US"/>
           </a:p>
@@ -12652,140 +12652,6 @@
       </p:sp>
       <p:sp>
         <p:nvSpPr>
-          <p:cNvPr id="6" name="Code Box">
-            <a:extLst>
-              <a:ext uri="{FF2B5EF4-FFF2-40B4-BE49-F238E27FC236}">
-                <a16:creationId xmlns:a16="http://schemas.microsoft.com/office/drawing/2014/main" id="{3278A82F-5546-4977-9F75-2A933B415945}"/>
-              </a:ext>
-            </a:extLst>
-          </p:cNvPr>
-          <p:cNvSpPr>
-            <a:spLocks noGrp="1"/>
-          </p:cNvSpPr>
-          <p:nvPr>
-            <p:ph type="body" sz="quarter" idx="11" hasCustomPrompt="1"/>
-          </p:nvPr>
-        </p:nvSpPr>
-        <p:spPr>
-          <a:xfrm>
-            <a:off x="621234" y="1931154"/>
-            <a:ext cx="10949531" cy="1362846"/>
-          </a:xfrm>
-          <a:prstGeom prst="rect">
-            <a:avLst/>
-          </a:prstGeom>
-          <a:solidFill>
-            <a:schemeClr val="accent6">
-              <a:lumMod val="75000"/>
-              <a:alpha val="15000"/>
-            </a:schemeClr>
-          </a:solidFill>
-          <a:ln w="12700">
-            <a:solidFill>
-              <a:schemeClr val="tx1">
-                <a:lumMod val="50000"/>
-              </a:schemeClr>
-            </a:solidFill>
-          </a:ln>
-        </p:spPr>
-        <p:txBody>
-          <a:bodyPr wrap="square" lIns="144000" tIns="108000" rIns="144000" bIns="108000">
-            <a:spAutoFit/>
-          </a:bodyPr>
-          <a:lstStyle>
-            <a:lvl1pPr marL="0" indent="0" latinLnBrk="0">
-              <a:lnSpc>
-                <a:spcPct val="105000"/>
-              </a:lnSpc>
-              <a:spcBef>
-                <a:spcPts val="0"/>
-              </a:spcBef>
-              <a:spcAft>
-                <a:spcPts val="0"/>
-              </a:spcAft>
-              <a:buNone/>
-              <a:defRPr lang="en-US" sz="2398" b="1" noProof="1" smtClean="0">
-                <a:solidFill>
-                  <a:schemeClr val="tx1"/>
-                </a:solidFill>
-                <a:effectLst/>
-                <a:latin typeface="Consolas" pitchFamily="49" charset="0"/>
-                <a:cs typeface="Consolas" pitchFamily="49" charset="0"/>
-              </a:defRPr>
-            </a:lvl1pPr>
-          </a:lstStyle>
-          <a:p>
-            <a:pPr marL="0" lvl="0"/>
-            <a:r>
-              <a:rPr lang="en-US" noProof="1"/>
-              <a:t>Source code box</a:t>
-            </a:r>
-          </a:p>
-          <a:p>
-            <a:pPr marL="0" lvl="0"/>
-            <a:r>
-              <a:rPr lang="en-US" noProof="1"/>
-              <a:t>…</a:t>
-            </a:r>
-          </a:p>
-          <a:p>
-            <a:pPr marL="0" lvl="0"/>
-            <a:r>
-              <a:rPr lang="en-US" noProof="1"/>
-              <a:t>…</a:t>
-            </a:r>
-          </a:p>
-        </p:txBody>
-      </p:sp>
-      <p:sp>
-        <p:nvSpPr>
-          <p:cNvPr id="21" name="Slide Body Text">
-            <a:extLst>
-              <a:ext uri="{FF2B5EF4-FFF2-40B4-BE49-F238E27FC236}">
-                <a16:creationId xmlns:a16="http://schemas.microsoft.com/office/drawing/2014/main" id="{04F318BE-2BAD-4677-871C-D78A4BF0CBA6}"/>
-              </a:ext>
-            </a:extLst>
-          </p:cNvPr>
-          <p:cNvSpPr>
-            <a:spLocks noGrp="1"/>
-          </p:cNvSpPr>
-          <p:nvPr>
-            <p:ph type="body" sz="quarter" idx="10" hasCustomPrompt="1"/>
-          </p:nvPr>
-        </p:nvSpPr>
-        <p:spPr>
-          <a:xfrm>
-            <a:off x="190501" y="1196126"/>
-            <a:ext cx="11811097" cy="5561124"/>
-          </a:xfrm>
-        </p:spPr>
-        <p:txBody>
-          <a:bodyPr/>
-          <a:lstStyle>
-            <a:lvl1pPr marL="0" indent="0" latinLnBrk="0">
-              <a:buNone/>
-              <a:defRPr>
-                <a:solidFill>
-                  <a:schemeClr val="tx1"/>
-                </a:solidFill>
-              </a:defRPr>
-            </a:lvl1pPr>
-            <a:lvl2pPr marL="609219" indent="0">
-              <a:buNone/>
-              <a:defRPr/>
-            </a:lvl2pPr>
-          </a:lstStyle>
-          <a:p>
-            <a:pPr lvl="0"/>
-            <a:r>
-              <a:rPr lang="en-US" noProof="0"/>
-              <a:t>Sample source code:</a:t>
-            </a:r>
-          </a:p>
-        </p:txBody>
-      </p:sp>
-      <p:sp>
-        <p:nvSpPr>
           <p:cNvPr id="9" name="Rectangle Top">
             <a:extLst>
               <a:ext uri="{FF2B5EF4-FFF2-40B4-BE49-F238E27FC236}">
@@ -12905,6 +12771,173 @@
           </a:prstGeom>
         </p:spPr>
       </p:pic>
+      <p:sp>
+        <p:nvSpPr>
+          <p:cNvPr id="10" name="Slide Body Text">
+            <a:extLst>
+              <a:ext uri="{FF2B5EF4-FFF2-40B4-BE49-F238E27FC236}">
+                <a16:creationId xmlns:a16="http://schemas.microsoft.com/office/drawing/2014/main" id="{ABF7534F-6B7C-42BC-8D3E-A81A9330B042}"/>
+              </a:ext>
+            </a:extLst>
+          </p:cNvPr>
+          <p:cNvSpPr>
+            <a:spLocks noGrp="1"/>
+          </p:cNvSpPr>
+          <p:nvPr>
+            <p:ph type="body" sz="quarter" idx="12" hasCustomPrompt="1"/>
+          </p:nvPr>
+        </p:nvSpPr>
+        <p:spPr>
+          <a:xfrm>
+            <a:off x="190402" y="1196125"/>
+            <a:ext cx="11818096" cy="5528766"/>
+          </a:xfrm>
+        </p:spPr>
+        <p:txBody>
+          <a:bodyPr/>
+          <a:lstStyle>
+            <a:lvl1pPr latinLnBrk="0">
+              <a:defRPr/>
+            </a:lvl1pPr>
+            <a:lvl2pPr latinLnBrk="0">
+              <a:defRPr/>
+            </a:lvl2pPr>
+            <a:lvl3pPr latinLnBrk="0">
+              <a:defRPr/>
+            </a:lvl3pPr>
+            <a:lvl4pPr latinLnBrk="0">
+              <a:defRPr/>
+            </a:lvl4pPr>
+            <a:lvl5pPr latinLnBrk="0">
+              <a:defRPr/>
+            </a:lvl5pPr>
+          </a:lstStyle>
+          <a:p>
+            <a:pPr lvl="0"/>
+            <a:r>
+              <a:rPr lang="en-US" noProof="0" dirty="0"/>
+              <a:t>This is a code example</a:t>
+            </a:r>
+          </a:p>
+        </p:txBody>
+      </p:sp>
+      <p:sp>
+        <p:nvSpPr>
+          <p:cNvPr id="7" name="Code Box">
+            <a:extLst>
+              <a:ext uri="{FF2B5EF4-FFF2-40B4-BE49-F238E27FC236}">
+                <a16:creationId xmlns:a16="http://schemas.microsoft.com/office/drawing/2014/main" id="{2A859B86-43A0-4668-8F56-FD92A7CAE87C}"/>
+              </a:ext>
+            </a:extLst>
+          </p:cNvPr>
+          <p:cNvSpPr>
+            <a:spLocks noGrp="1"/>
+          </p:cNvSpPr>
+          <p:nvPr>
+            <p:ph type="body" sz="quarter" idx="14" hasCustomPrompt="1"/>
+          </p:nvPr>
+        </p:nvSpPr>
+        <p:spPr>
+          <a:xfrm>
+            <a:off x="650875" y="2001688"/>
+            <a:ext cx="10845800" cy="2237893"/>
+          </a:xfrm>
+          <a:solidFill>
+            <a:schemeClr val="accent6">
+              <a:lumMod val="75000"/>
+              <a:alpha val="15000"/>
+            </a:schemeClr>
+          </a:solidFill>
+          <a:ln w="12700">
+            <a:solidFill>
+              <a:schemeClr val="tx1">
+                <a:lumMod val="50000"/>
+              </a:schemeClr>
+            </a:solidFill>
+          </a:ln>
+        </p:spPr>
+        <p:txBody>
+          <a:bodyPr vert="horz" wrap="square" lIns="144000" tIns="108000" rIns="144000" bIns="108000" rtlCol="0">
+            <a:spAutoFit/>
+          </a:bodyPr>
+          <a:lstStyle>
+            <a:lvl1pPr>
+              <a:buNone/>
+              <a:defRPr lang="en-US" sz="2800" b="1" smtClean="0">
+                <a:latin typeface="Consolas" pitchFamily="49" charset="0"/>
+              </a:defRPr>
+            </a:lvl1pPr>
+            <a:lvl2pPr>
+              <a:defRPr lang="en-US" smtClean="0"/>
+            </a:lvl2pPr>
+            <a:lvl3pPr>
+              <a:defRPr lang="en-US" smtClean="0"/>
+            </a:lvl3pPr>
+            <a:lvl4pPr>
+              <a:defRPr lang="en-US" smtClean="0"/>
+            </a:lvl4pPr>
+            <a:lvl5pPr>
+              <a:defRPr lang="en-US"/>
+            </a:lvl5pPr>
+          </a:lstStyle>
+          <a:p>
+            <a:pPr>
+              <a:spcBef>
+                <a:spcPts val="300"/>
+              </a:spcBef>
+              <a:spcAft>
+                <a:spcPts val="300"/>
+              </a:spcAft>
+            </a:pPr>
+            <a:r>
+              <a:rPr lang="en-US" noProof="1"/>
+              <a:t>Source code box</a:t>
+            </a:r>
+          </a:p>
+          <a:p>
+            <a:pPr>
+              <a:spcBef>
+                <a:spcPts val="300"/>
+              </a:spcBef>
+              <a:spcAft>
+                <a:spcPts val="300"/>
+              </a:spcAft>
+            </a:pPr>
+            <a:r>
+              <a:rPr lang="en-US" noProof="1"/>
+              <a:t>…</a:t>
+            </a:r>
+          </a:p>
+          <a:p>
+            <a:pPr>
+              <a:spcBef>
+                <a:spcPts val="300"/>
+              </a:spcBef>
+              <a:spcAft>
+                <a:spcPts val="300"/>
+              </a:spcAft>
+            </a:pPr>
+            <a:r>
+              <a:rPr lang="en-US" noProof="1"/>
+              <a:t>…</a:t>
+            </a:r>
+          </a:p>
+          <a:p>
+            <a:pPr>
+              <a:spcBef>
+                <a:spcPts val="300"/>
+              </a:spcBef>
+              <a:spcAft>
+                <a:spcPts val="300"/>
+              </a:spcAft>
+            </a:pPr>
+            <a:r>
+              <a:rPr lang="en-US" noProof="1"/>
+              <a:t>…</a:t>
+            </a:r>
+          </a:p>
+        </p:txBody>
+      </p:sp>
       <p:sp>
         <p:nvSpPr>
           <p:cNvPr id="11" name="Slide Title">
@@ -22408,7 +22441,7 @@
             <a:spLocks noGrp="1"/>
           </p:cNvSpPr>
           <p:nvPr>
-            <p:ph type="body" sz="quarter" idx="10"/>
+            <p:ph type="body" sz="quarter" idx="4294967295"/>
           </p:nvPr>
         </p:nvSpPr>
         <p:spPr>
@@ -22672,7 +22705,7 @@
             <a:spLocks noGrp="1"/>
           </p:cNvSpPr>
           <p:nvPr>
-            <p:ph type="body" sz="quarter" idx="11"/>
+            <p:ph type="body" sz="quarter" idx="4294967295"/>
           </p:nvPr>
         </p:nvSpPr>
         <p:spPr>
@@ -22682,7 +22715,9 @@
           </a:xfrm>
         </p:spPr>
         <p:txBody>
-          <a:bodyPr/>
+          <a:bodyPr>
+            <a:normAutofit fontScale="85000" lnSpcReduction="20000"/>
+          </a:bodyPr>
           <a:lstStyle/>
           <a:p>
             <a:r>
@@ -23446,7 +23481,7 @@
             <a:spLocks noGrp="1"/>
           </p:cNvSpPr>
           <p:nvPr>
-            <p:ph type="body" sz="quarter" idx="11"/>
+            <p:ph type="body" sz="quarter" idx="4294967295"/>
           </p:nvPr>
         </p:nvSpPr>
         <p:spPr>
@@ -32135,7 +32170,7 @@
             <a:spLocks noGrp="1"/>
           </p:cNvSpPr>
           <p:nvPr>
-            <p:ph type="body" sz="quarter" idx="10"/>
+            <p:ph type="body" sz="quarter" idx="12"/>
           </p:nvPr>
         </p:nvSpPr>
         <p:spPr/>
@@ -32153,10 +32188,10 @@
       </p:sp>
       <p:sp>
         <p:nvSpPr>
-          <p:cNvPr id="7" name="Code Box">
+          <p:cNvPr id="11" name="Text Placeholder 10">
             <a:extLst>
               <a:ext uri="{FF2B5EF4-FFF2-40B4-BE49-F238E27FC236}">
-                <a16:creationId xmlns:a16="http://schemas.microsoft.com/office/drawing/2014/main" id="{608FC60A-0A26-44DD-82A6-EF4EB0DE6F3F}"/>
+                <a16:creationId xmlns:a16="http://schemas.microsoft.com/office/drawing/2014/main" id="{C4800AFF-0EC8-43DC-B87C-D321C4D29036}"/>
               </a:ext>
             </a:extLst>
           </p:cNvPr>
@@ -32164,13 +32199,13 @@
             <a:spLocks noGrp="1"/>
           </p:cNvSpPr>
           <p:nvPr>
-            <p:ph type="body" sz="quarter" idx="11"/>
+            <p:ph type="body" sz="quarter" idx="14"/>
           </p:nvPr>
         </p:nvSpPr>
         <p:spPr>
           <a:xfrm>
-            <a:off x="677678" y="2036307"/>
-            <a:ext cx="10836642" cy="4317693"/>
+            <a:off x="650875" y="2001688"/>
+            <a:ext cx="10845800" cy="4201508"/>
           </a:xfrm>
         </p:spPr>
         <p:txBody>
@@ -32178,47 +32213,47 @@
           <a:lstStyle/>
           <a:p>
             <a:pPr>
-              <a:lnSpc>
-                <a:spcPct val="120000"/>
-              </a:lnSpc>
               <a:spcBef>
-                <a:spcPts val="0"/>
+                <a:spcPts val="300"/>
               </a:spcBef>
+              <a:spcAft>
+                <a:spcPts val="300"/>
+              </a:spcAft>
             </a:pPr>
             <a:r>
-              <a:rPr lang="en-US" sz="2800" dirty="0"/>
+              <a:rPr lang="en-US" noProof="1"/>
               <a:t>class Abstract {</a:t>
             </a:r>
           </a:p>
           <a:p>
             <a:pPr>
-              <a:lnSpc>
-                <a:spcPct val="120000"/>
-              </a:lnSpc>
               <a:spcBef>
-                <a:spcPts val="0"/>
+                <a:spcPts val="300"/>
               </a:spcBef>
+              <a:spcAft>
+                <a:spcPts val="300"/>
+              </a:spcAft>
             </a:pPr>
             <a:r>
-              <a:rPr lang="en-US" sz="2800" dirty="0"/>
+              <a:rPr lang="en-US" noProof="1"/>
               <a:t>  constructor() {</a:t>
             </a:r>
           </a:p>
           <a:p>
             <a:pPr>
-              <a:lnSpc>
-                <a:spcPct val="120000"/>
-              </a:lnSpc>
               <a:spcBef>
-                <a:spcPts val="0"/>
+                <a:spcPts val="300"/>
               </a:spcBef>
+              <a:spcAft>
+                <a:spcPts val="300"/>
+              </a:spcAft>
             </a:pPr>
             <a:r>
-              <a:rPr lang="en-US" sz="2800" dirty="0"/>
+              <a:rPr lang="en-US" noProof="1"/>
               <a:t>    if (</a:t>
             </a:r>
             <a:r>
-              <a:rPr lang="en-US" sz="2800" dirty="0">
+              <a:rPr lang="en-US" noProof="1">
                 <a:solidFill>
                   <a:schemeClr val="bg1"/>
                 </a:solidFill>
@@ -32226,25 +32261,25 @@
               <a:t>new.target </a:t>
             </a:r>
             <a:r>
-              <a:rPr lang="en-US" sz="2800" dirty="0"/>
+              <a:rPr lang="en-US" noProof="1"/>
               <a:t>=== Abstract) {</a:t>
             </a:r>
           </a:p>
           <a:p>
             <a:pPr>
-              <a:lnSpc>
-                <a:spcPct val="120000"/>
-              </a:lnSpc>
               <a:spcBef>
-                <a:spcPts val="0"/>
+                <a:spcPts val="300"/>
               </a:spcBef>
+              <a:spcAft>
+                <a:spcPts val="300"/>
+              </a:spcAft>
             </a:pPr>
             <a:r>
-              <a:rPr lang="en-US" sz="2800" dirty="0"/>
+              <a:rPr lang="en-US" noProof="1"/>
               <a:t>      </a:t>
             </a:r>
             <a:r>
-              <a:rPr lang="en-US" sz="2800" dirty="0">
+              <a:rPr lang="en-US" noProof="1">
                 <a:solidFill>
                   <a:schemeClr val="bg1"/>
                 </a:solidFill>
@@ -32252,52 +32287,51 @@
               <a:t>throw new TypeError</a:t>
             </a:r>
             <a:r>
-              <a:rPr lang="en-US" sz="2800" dirty="0"/>
+              <a:rPr lang="en-US" noProof="1"/>
               <a:t>("Cannot construct Abstract</a:t>
             </a:r>
             <a:br>
-              <a:rPr lang="en-US" sz="2800" dirty="0"/>
+              <a:rPr lang="en-US" noProof="1"/>
             </a:br>
             <a:r>
-              <a:rPr lang="en-US" sz="2800" dirty="0"/>
+              <a:rPr lang="en-US" noProof="1"/>
               <a:t>        instances directly");</a:t>
             </a:r>
             <a:br>
-              <a:rPr lang="en-US" sz="2800" dirty="0"/>
+              <a:rPr lang="en-US" noProof="1"/>
             </a:br>
             <a:r>
-              <a:rPr lang="en-US" sz="2800" dirty="0"/>
+              <a:rPr lang="en-US" noProof="1"/>
               <a:t>    }</a:t>
             </a:r>
           </a:p>
           <a:p>
             <a:pPr>
-              <a:lnSpc>
-                <a:spcPct val="120000"/>
-              </a:lnSpc>
               <a:spcBef>
-                <a:spcPts val="0"/>
+                <a:spcPts val="300"/>
               </a:spcBef>
+              <a:spcAft>
+                <a:spcPts val="300"/>
+              </a:spcAft>
             </a:pPr>
             <a:r>
-              <a:rPr lang="en-US" sz="2800" dirty="0"/>
+              <a:rPr lang="en-US" noProof="1"/>
               <a:t>  }</a:t>
             </a:r>
           </a:p>
           <a:p>
             <a:pPr>
-              <a:lnSpc>
-                <a:spcPct val="120000"/>
-              </a:lnSpc>
               <a:spcBef>
-                <a:spcPts val="0"/>
+                <a:spcPts val="300"/>
               </a:spcBef>
+              <a:spcAft>
+                <a:spcPts val="300"/>
+              </a:spcAft>
             </a:pPr>
             <a:r>
-              <a:rPr lang="en-US" sz="2800" dirty="0"/>
+              <a:rPr lang="en-US" noProof="1"/>
               <a:t>}</a:t>
             </a:r>
-            <a:endParaRPr lang="bg-BG" sz="2800" dirty="0"/>
           </a:p>
         </p:txBody>
       </p:sp>
@@ -32317,12 +32351,7 @@
             <p:ph type="title"/>
           </p:nvPr>
         </p:nvSpPr>
-        <p:spPr>
-          <a:xfrm>
-            <a:off x="190405" y="100750"/>
-            <a:ext cx="9669213" cy="882654"/>
-          </a:xfrm>
-        </p:spPr>
+        <p:spPr/>
         <p:txBody>
           <a:bodyPr/>
           <a:lstStyle/>
@@ -32353,196 +32382,6 @@
       <p:transition spd="slow" advClick="0" advTm="5000"/>
     </mc:Fallback>
   </mc:AlternateContent>
-  <p:timing>
-    <p:tnLst>
-      <p:par>
-        <p:cTn id="1" dur="indefinite" restart="never" nodeType="tmRoot">
-          <p:childTnLst>
-            <p:seq concurrent="1" nextAc="seek">
-              <p:cTn id="2" dur="indefinite" nodeType="mainSeq">
-                <p:childTnLst>
-                  <p:par>
-                    <p:cTn id="3" fill="hold">
-                      <p:stCondLst>
-                        <p:cond delay="indefinite"/>
-                      </p:stCondLst>
-                      <p:childTnLst>
-                        <p:par>
-                          <p:cTn id="4" fill="hold">
-                            <p:stCondLst>
-                              <p:cond delay="0"/>
-                            </p:stCondLst>
-                            <p:childTnLst>
-                              <p:par>
-                                <p:cTn id="5" presetID="1" presetClass="entr" presetSubtype="0" fill="hold" nodeType="clickEffect">
-                                  <p:stCondLst>
-                                    <p:cond delay="0"/>
-                                  </p:stCondLst>
-                                  <p:childTnLst>
-                                    <p:set>
-                                      <p:cBhvr>
-                                        <p:cTn id="6" dur="1" fill="hold">
-                                          <p:stCondLst>
-                                            <p:cond delay="0"/>
-                                          </p:stCondLst>
-                                        </p:cTn>
-                                        <p:tgtEl>
-                                          <p:spTgt spid="7">
-                                            <p:txEl>
-                                              <p:pRg st="1" end="1"/>
-                                            </p:txEl>
-                                          </p:spTgt>
-                                        </p:tgtEl>
-                                        <p:attrNameLst>
-                                          <p:attrName>style.visibility</p:attrName>
-                                        </p:attrNameLst>
-                                      </p:cBhvr>
-                                      <p:to>
-                                        <p:strVal val="visible"/>
-                                      </p:to>
-                                    </p:set>
-                                  </p:childTnLst>
-                                </p:cTn>
-                              </p:par>
-                              <p:par>
-                                <p:cTn id="7" presetID="1" presetClass="entr" presetSubtype="0" fill="hold" nodeType="withEffect">
-                                  <p:stCondLst>
-                                    <p:cond delay="0"/>
-                                  </p:stCondLst>
-                                  <p:childTnLst>
-                                    <p:set>
-                                      <p:cBhvr>
-                                        <p:cTn id="8" dur="1" fill="hold">
-                                          <p:stCondLst>
-                                            <p:cond delay="0"/>
-                                          </p:stCondLst>
-                                        </p:cTn>
-                                        <p:tgtEl>
-                                          <p:spTgt spid="7">
-                                            <p:txEl>
-                                              <p:pRg st="4" end="4"/>
-                                            </p:txEl>
-                                          </p:spTgt>
-                                        </p:tgtEl>
-                                        <p:attrNameLst>
-                                          <p:attrName>style.visibility</p:attrName>
-                                        </p:attrNameLst>
-                                      </p:cBhvr>
-                                      <p:to>
-                                        <p:strVal val="visible"/>
-                                      </p:to>
-                                    </p:set>
-                                  </p:childTnLst>
-                                </p:cTn>
-                              </p:par>
-                            </p:childTnLst>
-                          </p:cTn>
-                        </p:par>
-                      </p:childTnLst>
-                    </p:cTn>
-                  </p:par>
-                  <p:par>
-                    <p:cTn id="9" fill="hold">
-                      <p:stCondLst>
-                        <p:cond delay="indefinite"/>
-                      </p:stCondLst>
-                      <p:childTnLst>
-                        <p:par>
-                          <p:cTn id="10" fill="hold">
-                            <p:stCondLst>
-                              <p:cond delay="0"/>
-                            </p:stCondLst>
-                            <p:childTnLst>
-                              <p:par>
-                                <p:cTn id="11" presetID="1" presetClass="entr" presetSubtype="0" fill="hold" nodeType="clickEffect">
-                                  <p:stCondLst>
-                                    <p:cond delay="0"/>
-                                  </p:stCondLst>
-                                  <p:childTnLst>
-                                    <p:set>
-                                      <p:cBhvr>
-                                        <p:cTn id="12" dur="1" fill="hold">
-                                          <p:stCondLst>
-                                            <p:cond delay="0"/>
-                                          </p:stCondLst>
-                                        </p:cTn>
-                                        <p:tgtEl>
-                                          <p:spTgt spid="7">
-                                            <p:txEl>
-                                              <p:pRg st="2" end="2"/>
-                                            </p:txEl>
-                                          </p:spTgt>
-                                        </p:tgtEl>
-                                        <p:attrNameLst>
-                                          <p:attrName>style.visibility</p:attrName>
-                                        </p:attrNameLst>
-                                      </p:cBhvr>
-                                      <p:to>
-                                        <p:strVal val="visible"/>
-                                      </p:to>
-                                    </p:set>
-                                  </p:childTnLst>
-                                </p:cTn>
-                              </p:par>
-                              <p:par>
-                                <p:cTn id="13" presetID="1" presetClass="entr" presetSubtype="0" fill="hold" nodeType="withEffect">
-                                  <p:stCondLst>
-                                    <p:cond delay="0"/>
-                                  </p:stCondLst>
-                                  <p:childTnLst>
-                                    <p:set>
-                                      <p:cBhvr>
-                                        <p:cTn id="14" dur="1" fill="hold">
-                                          <p:stCondLst>
-                                            <p:cond delay="0"/>
-                                          </p:stCondLst>
-                                        </p:cTn>
-                                        <p:tgtEl>
-                                          <p:spTgt spid="7">
-                                            <p:txEl>
-                                              <p:pRg st="3" end="3"/>
-                                            </p:txEl>
-                                          </p:spTgt>
-                                        </p:tgtEl>
-                                        <p:attrNameLst>
-                                          <p:attrName>style.visibility</p:attrName>
-                                        </p:attrNameLst>
-                                      </p:cBhvr>
-                                      <p:to>
-                                        <p:strVal val="visible"/>
-                                      </p:to>
-                                    </p:set>
-                                  </p:childTnLst>
-                                </p:cTn>
-                              </p:par>
-                            </p:childTnLst>
-                          </p:cTn>
-                        </p:par>
-                      </p:childTnLst>
-                    </p:cTn>
-                  </p:par>
-                </p:childTnLst>
-              </p:cTn>
-              <p:prevCondLst>
-                <p:cond evt="onPrev" delay="0">
-                  <p:tgtEl>
-                    <p:sldTgt/>
-                  </p:tgtEl>
-                </p:cond>
-              </p:prevCondLst>
-              <p:nextCondLst>
-                <p:cond evt="onNext" delay="0">
-                  <p:tgtEl>
-                    <p:sldTgt/>
-                  </p:tgtEl>
-                </p:cond>
-              </p:nextCondLst>
-            </p:seq>
-          </p:childTnLst>
-        </p:cTn>
-      </p:par>
-    </p:tnLst>
-  </p:timing>
 </p:sld>
 </file>
 

</xml_diff>

<commit_message>
bug fixes in the templates
</commit_message>
<xml_diff>
--- a/Document-Templates/SoftUni-International-PowerPoint-Template-July-2020.pptx
+++ b/Document-Templates/SoftUni-International-PowerPoint-Template-July-2020.pptx
@@ -287,7 +287,7 @@
           <a:p>
             <a:fld id="{4E087215-0C8F-4762-A664-737A353EC9A4}" type="datetimeFigureOut">
               <a:rPr lang="bg-BG" smtClean="0"/>
-              <a:t>12.11.2020 г.</a:t>
+              <a:t>25.8.2023 г.</a:t>
             </a:fld>
             <a:endParaRPr lang="bg-BG"/>
           </a:p>
@@ -478,7 +478,7 @@
           <a:p>
             <a:fld id="{72D84649-876A-46C9-8472-14CB09C070D8}" type="datetimeFigureOut">
               <a:rPr lang="en-US" smtClean="0"/>
-              <a:t>12-Nov-20</a:t>
+              <a:t>25-Aug-23</a:t>
             </a:fld>
             <a:endParaRPr lang="en-US"/>
           </a:p>
@@ -12620,6 +12620,49 @@
           </a:p>
         </p:txBody>
       </p:sp>
+      <p:pic>
+        <p:nvPicPr>
+          <p:cNvPr id="5" name="Picture Placeholder 5" descr="A person using a computer&#10;&#10;Description automatically generated">
+            <a:extLst>
+              <a:ext uri="{FF2B5EF4-FFF2-40B4-BE49-F238E27FC236}">
+                <a16:creationId xmlns:a16="http://schemas.microsoft.com/office/drawing/2014/main" id="{4C57C82A-A320-704B-DA73-93712D8DC454}"/>
+              </a:ext>
+            </a:extLst>
+          </p:cNvPr>
+          <p:cNvPicPr>
+            <a:picLocks noGrp="1" noChangeAspect="1"/>
+          </p:cNvPicPr>
+          <p:nvPr>
+            <p:ph type="pic" sz="quarter" idx="10"/>
+          </p:nvPr>
+        </p:nvPicPr>
+        <p:blipFill>
+          <a:blip r:embed="rId4" cstate="print">
+            <a:extLst>
+              <a:ext uri="{28A0092B-C50C-407E-A947-70E740481C1C}">
+                <a14:useLocalDpi xmlns:a14="http://schemas.microsoft.com/office/drawing/2010/main" val="0"/>
+              </a:ext>
+            </a:extLst>
+          </a:blip>
+          <a:srcRect/>
+          <a:stretch>
+            <a:fillRect/>
+          </a:stretch>
+        </p:blipFill>
+        <p:spPr>
+          <a:xfrm>
+            <a:off x="4386000" y="2924668"/>
+            <a:ext cx="3670560" cy="2068844"/>
+          </a:xfrm>
+          <a:ln>
+            <a:solidFill>
+              <a:schemeClr val="bg2">
+                <a:lumMod val="85000"/>
+              </a:schemeClr>
+            </a:solidFill>
+          </a:ln>
+        </p:spPr>
+      </p:pic>
     </p:spTree>
     <p:extLst>
       <p:ext uri="{BB962C8B-B14F-4D97-AF65-F5344CB8AC3E}">
@@ -17152,7 +17195,7 @@
               <a:t>The </a:t>
             </a:r>
             <a:r>
-              <a:rPr lang="en-US" dirty="0">
+              <a:rPr lang="en-US" b="1" dirty="0">
                 <a:solidFill>
                   <a:schemeClr val="accent1"/>
                 </a:solidFill>
@@ -17164,7 +17207,7 @@
               <a:t>is preserved, with </a:t>
             </a:r>
             <a:r>
-              <a:rPr lang="en-US" dirty="0">
+              <a:rPr lang="en-US" b="1" dirty="0">
                 <a:solidFill>
                   <a:schemeClr val="accent1"/>
                 </a:solidFill>
@@ -18077,7 +18120,7 @@
               <a:t>Write a JS function to extract all </a:t>
             </a:r>
             <a:r>
-              <a:rPr lang="en-US" dirty="0">
+              <a:rPr lang="en-US" b="1" dirty="0">
                 <a:solidFill>
                   <a:schemeClr val="accent1"/>
                 </a:solidFill>
@@ -18085,7 +18128,7 @@
               <a:t>unique</a:t>
             </a:r>
             <a:r>
-              <a:rPr lang="en-US" dirty="0">
+              <a:rPr lang="en-US" b="1" dirty="0">
                 <a:solidFill>
                   <a:schemeClr val="accent1">
                     <a:lumMod val="75000"/>
@@ -18095,7 +18138,7 @@
               <a:t> </a:t>
             </a:r>
             <a:r>
-              <a:rPr lang="en-US" dirty="0">
+              <a:rPr lang="en-US" b="1" dirty="0">
                 <a:solidFill>
                   <a:schemeClr val="accent1"/>
                 </a:solidFill>
@@ -18103,7 +18146,7 @@
               <a:t>words</a:t>
             </a:r>
             <a:r>
-              <a:rPr lang="en-US" dirty="0">
+              <a:rPr lang="en-US" b="1" dirty="0">
                 <a:solidFill>
                   <a:schemeClr val="accent1">
                     <a:lumMod val="75000"/>
@@ -18114,22 +18157,14 @@
             </a:r>
             <a:r>
               <a:rPr lang="en-US" dirty="0"/>
-              <a:t>from </a:t>
-            </a:r>
-            <a:r>
-              <a:rPr lang="en-US"/>
-              <a:t>a text</a:t>
+              <a:t>from a text</a:t>
             </a:r>
             <a:br>
-              <a:rPr lang="en-US"/>
+              <a:rPr lang="en-US" dirty="0"/>
             </a:br>
             <a:r>
-              <a:rPr lang="en-US"/>
-              <a:t>(</a:t>
-            </a:r>
-            <a:r>
               <a:rPr lang="en-US" dirty="0"/>
-              <a:t>case insensitive)</a:t>
+              <a:t>(case insensitive)</a:t>
             </a:r>
           </a:p>
           <a:p>
@@ -18143,7 +18178,7 @@
               <a:t>Words are sequences of </a:t>
             </a:r>
             <a:r>
-              <a:rPr lang="en-US" dirty="0">
+              <a:rPr lang="en-US" b="1" dirty="0">
                 <a:solidFill>
                   <a:schemeClr val="accent1"/>
                 </a:solidFill>
@@ -18155,7 +18190,7 @@
               <a:t>, </a:t>
             </a:r>
             <a:r>
-              <a:rPr lang="en-US" dirty="0">
+              <a:rPr lang="en-US" b="1" dirty="0">
                 <a:solidFill>
                   <a:schemeClr val="accent1"/>
                 </a:solidFill>
@@ -18167,7 +18202,7 @@
               <a:t> and </a:t>
             </a:r>
             <a:r>
-              <a:rPr lang="en-US" dirty="0">
+              <a:rPr lang="en-US" b="1" dirty="0">
                 <a:solidFill>
                   <a:schemeClr val="accent1"/>
                 </a:solidFill>
@@ -18186,7 +18221,7 @@
               <a:t>The </a:t>
             </a:r>
             <a:r>
-              <a:rPr lang="en-US" dirty="0">
+              <a:rPr lang="en-US" b="1" dirty="0">
                 <a:solidFill>
                   <a:schemeClr val="accent1"/>
                 </a:solidFill>
@@ -18198,7 +18233,7 @@
               <a:t> comes as </a:t>
             </a:r>
             <a:r>
-              <a:rPr lang="en-US" dirty="0">
+              <a:rPr lang="en-US" b="1" dirty="0">
                 <a:solidFill>
                   <a:schemeClr val="accent1"/>
                 </a:solidFill>
@@ -18206,7 +18241,7 @@
               <a:t>array</a:t>
             </a:r>
             <a:r>
-              <a:rPr lang="en-US" dirty="0">
+              <a:rPr lang="en-US" b="1" dirty="0">
                 <a:solidFill>
                   <a:schemeClr val="accent1">
                     <a:lumMod val="75000"/>
@@ -18216,7 +18251,7 @@
               <a:t> </a:t>
             </a:r>
             <a:r>
-              <a:rPr lang="en-US" dirty="0">
+              <a:rPr lang="en-US" b="1" dirty="0">
                 <a:solidFill>
                   <a:schemeClr val="accent1"/>
                 </a:solidFill>
@@ -18224,7 +18259,7 @@
               <a:t>of</a:t>
             </a:r>
             <a:r>
-              <a:rPr lang="en-US" dirty="0">
+              <a:rPr lang="en-US" b="1" dirty="0">
                 <a:solidFill>
                   <a:schemeClr val="accent1">
                     <a:lumMod val="75000"/>
@@ -18234,7 +18269,7 @@
               <a:t> </a:t>
             </a:r>
             <a:r>
-              <a:rPr lang="en-US" dirty="0">
+              <a:rPr lang="en-US" b="1" dirty="0">
                 <a:solidFill>
                   <a:schemeClr val="accent1"/>
                 </a:solidFill>
@@ -18253,7 +18288,7 @@
               <a:t>The </a:t>
             </a:r>
             <a:r>
-              <a:rPr lang="en-US" dirty="0">
+              <a:rPr lang="en-US" b="1" dirty="0">
                 <a:solidFill>
                   <a:schemeClr val="accent1"/>
                 </a:solidFill>
@@ -18265,7 +18300,7 @@
               <a:t> should hold the words in their </a:t>
             </a:r>
             <a:r>
-              <a:rPr lang="en-US" dirty="0">
+              <a:rPr lang="en-US" b="1" dirty="0">
                 <a:solidFill>
                   <a:schemeClr val="accent1"/>
                 </a:solidFill>
@@ -18273,7 +18308,7 @@
               <a:t>order</a:t>
             </a:r>
             <a:r>
-              <a:rPr lang="en-US" dirty="0">
+              <a:rPr lang="en-US" b="1" dirty="0">
                 <a:solidFill>
                   <a:schemeClr val="accent1">
                     <a:lumMod val="75000"/>
@@ -18283,7 +18318,7 @@
               <a:t> </a:t>
             </a:r>
             <a:r>
-              <a:rPr lang="en-US" dirty="0">
+              <a:rPr lang="en-US" b="1" dirty="0">
                 <a:solidFill>
                   <a:schemeClr val="accent1"/>
                 </a:solidFill>
@@ -18291,7 +18326,7 @@
               <a:t>of</a:t>
             </a:r>
             <a:r>
-              <a:rPr lang="en-US" dirty="0">
+              <a:rPr lang="en-US" b="1" dirty="0">
                 <a:solidFill>
                   <a:schemeClr val="accent1">
                     <a:lumMod val="75000"/>
@@ -18301,7 +18336,7 @@
               <a:t> </a:t>
             </a:r>
             <a:r>
-              <a:rPr lang="en-US" dirty="0">
+              <a:rPr lang="en-US" b="1" dirty="0">
                 <a:solidFill>
                   <a:schemeClr val="accent1"/>
                 </a:solidFill>
@@ -19245,218 +19280,208 @@
         </p:nvSpPr>
         <p:spPr>
           <a:xfrm>
-            <a:off x="615283" y="1851024"/>
+            <a:off x="620104" y="1851024"/>
             <a:ext cx="10951129" cy="3690535"/>
           </a:xfrm>
+          <a:solidFill>
+            <a:schemeClr val="accent6">
+              <a:lumMod val="75000"/>
+              <a:alpha val="15000"/>
+            </a:schemeClr>
+          </a:solidFill>
+          <a:ln w="12700">
+            <a:solidFill>
+              <a:schemeClr val="tx1">
+                <a:lumMod val="50000"/>
+              </a:schemeClr>
+            </a:solidFill>
+          </a:ln>
         </p:spPr>
         <p:txBody>
-          <a:bodyPr>
-            <a:normAutofit fontScale="85000" lnSpcReduction="20000"/>
+          <a:bodyPr vert="horz" wrap="square" lIns="144000" tIns="108000" rIns="144000" bIns="108000" rtlCol="0">
+            <a:spAutoFit/>
           </a:bodyPr>
           <a:lstStyle/>
           <a:p>
-            <a:r>
-              <a:rPr lang="en-US" sz="2400" dirty="0"/>
+            <a:pPr marL="0" indent="0">
+              <a:spcBef>
+                <a:spcPts val="0"/>
+              </a:spcBef>
+              <a:spcAft>
+                <a:spcPts val="0"/>
+              </a:spcAft>
+              <a:buNone/>
+            </a:pPr>
+            <a:r>
+              <a:rPr lang="en-US" sz="2400" b="1" noProof="1">
+                <a:latin typeface="Consolas" pitchFamily="49" charset="0"/>
+              </a:rPr>
               <a:t>function extractWords(inputSentences) {</a:t>
             </a:r>
           </a:p>
           <a:p>
-            <a:r>
-              <a:rPr lang="en-US" sz="2400" dirty="0"/>
-              <a:t>  let wordPattern = </a:t>
-            </a:r>
-            <a:r>
-              <a:rPr lang="en-US" sz="2400" dirty="0">
+            <a:pPr marL="0" indent="0">
+              <a:spcBef>
+                <a:spcPts val="0"/>
+              </a:spcBef>
+              <a:spcAft>
+                <a:spcPts val="0"/>
+              </a:spcAft>
+              <a:buNone/>
+            </a:pPr>
+            <a:r>
+              <a:rPr lang="en-US" sz="2400" b="1" noProof="1">
+                <a:latin typeface="Consolas" pitchFamily="49" charset="0"/>
+              </a:rPr>
+              <a:t>  let wordPattern = /</a:t>
+            </a:r>
+            <a:r>
+              <a:rPr lang="en-US" sz="2400" b="1" noProof="1">
                 <a:solidFill>
                   <a:schemeClr val="bg1"/>
                 </a:solidFill>
+                <a:latin typeface="Consolas" pitchFamily="49" charset="0"/>
               </a:rPr>
-              <a:t>/</a:t>
-            </a:r>
-            <a:r>
-              <a:rPr lang="en-US" sz="2400" dirty="0"/>
               <a:t>\b[a-zA-Z0-9_]+\b</a:t>
             </a:r>
             <a:r>
-              <a:rPr lang="en-US" sz="2400" dirty="0">
+              <a:rPr lang="en-US" sz="2400" b="1" noProof="1">
+                <a:latin typeface="Consolas" pitchFamily="49" charset="0"/>
+              </a:rPr>
+              <a:t>/g;</a:t>
+            </a:r>
+          </a:p>
+          <a:p>
+            <a:pPr marL="0" indent="0">
+              <a:spcBef>
+                <a:spcPts val="0"/>
+              </a:spcBef>
+              <a:spcAft>
+                <a:spcPts val="0"/>
+              </a:spcAft>
+              <a:buNone/>
+            </a:pPr>
+            <a:r>
+              <a:rPr lang="en-US" sz="2400" b="1" noProof="1">
+                <a:latin typeface="Consolas" pitchFamily="49" charset="0"/>
+              </a:rPr>
+              <a:t>  let words = new Set();</a:t>
+            </a:r>
+          </a:p>
+          <a:p>
+            <a:pPr marL="0" indent="0">
+              <a:spcBef>
+                <a:spcPts val="0"/>
+              </a:spcBef>
+              <a:spcAft>
+                <a:spcPts val="0"/>
+              </a:spcAft>
+              <a:buNone/>
+            </a:pPr>
+            <a:r>
+              <a:rPr lang="en-US" sz="2400" b="1" noProof="1">
+                <a:latin typeface="Consolas" pitchFamily="49" charset="0"/>
+              </a:rPr>
+              <a:t>  for (let sentence of inputSentences) {</a:t>
+            </a:r>
+          </a:p>
+          <a:p>
+            <a:pPr marL="0" indent="0">
+              <a:spcBef>
+                <a:spcPts val="0"/>
+              </a:spcBef>
+              <a:spcAft>
+                <a:spcPts val="0"/>
+              </a:spcAft>
+              <a:buNone/>
+            </a:pPr>
+            <a:r>
+              <a:rPr lang="en-US" sz="2400" b="1" noProof="1">
+                <a:latin typeface="Consolas" pitchFamily="49" charset="0"/>
+              </a:rPr>
+              <a:t>    let matches = sentence.</a:t>
+            </a:r>
+            <a:r>
+              <a:rPr lang="en-US" sz="2400" b="1" noProof="1">
                 <a:solidFill>
                   <a:schemeClr val="bg1"/>
                 </a:solidFill>
-              </a:rPr>
-              <a:t>/</a:t>
-            </a:r>
-            <a:r>
-              <a:rPr lang="en-US" sz="2400" dirty="0"/>
-              <a:t>g;</a:t>
-            </a:r>
-          </a:p>
-          <a:p>
-            <a:r>
-              <a:rPr lang="en-US" sz="2400" dirty="0"/>
-              <a:t>  let words = </a:t>
-            </a:r>
-            <a:r>
-              <a:rPr lang="en-US" sz="2400" dirty="0">
-                <a:solidFill>
-                  <a:schemeClr val="bg1"/>
-                </a:solidFill>
-              </a:rPr>
-              <a:t>new Set()</a:t>
-            </a:r>
-            <a:r>
-              <a:rPr lang="en-US" sz="2400" dirty="0"/>
-              <a:t>;</a:t>
-            </a:r>
-          </a:p>
-          <a:p>
-            <a:r>
-              <a:rPr lang="en-US" sz="2400" dirty="0"/>
-              <a:t>  </a:t>
-            </a:r>
-            <a:r>
-              <a:rPr lang="en-US" sz="2400" dirty="0">
-                <a:solidFill>
-                  <a:schemeClr val="bg1"/>
-                </a:solidFill>
-              </a:rPr>
-              <a:t>for</a:t>
-            </a:r>
-            <a:r>
-              <a:rPr lang="en-US" sz="2400" dirty="0"/>
-              <a:t> (let sentence </a:t>
-            </a:r>
-            <a:r>
-              <a:rPr lang="en-US" sz="2400" dirty="0">
-                <a:solidFill>
-                  <a:schemeClr val="bg1"/>
-                </a:solidFill>
-              </a:rPr>
-              <a:t>of</a:t>
-            </a:r>
-            <a:r>
-              <a:rPr lang="en-US" sz="2400" dirty="0"/>
-              <a:t> inputSentences) {</a:t>
-            </a:r>
-          </a:p>
-          <a:p>
-            <a:r>
-              <a:rPr lang="en-US" sz="2400" dirty="0"/>
-              <a:t>    let matches = sentence.</a:t>
-            </a:r>
-            <a:r>
-              <a:rPr lang="en-US" sz="2400" dirty="0">
-                <a:solidFill>
-                  <a:schemeClr val="bg1"/>
-                </a:solidFill>
+                <a:latin typeface="Consolas" pitchFamily="49" charset="0"/>
               </a:rPr>
               <a:t>match</a:t>
             </a:r>
             <a:r>
-              <a:rPr lang="en-US" sz="2400" dirty="0"/>
+              <a:rPr lang="en-US" sz="2400" b="1" noProof="1">
+                <a:latin typeface="Consolas" pitchFamily="49" charset="0"/>
+              </a:rPr>
               <a:t>(wordPattern);</a:t>
             </a:r>
           </a:p>
           <a:p>
-            <a:r>
-              <a:rPr lang="en-US" sz="2400" dirty="0"/>
-              <a:t>    matches.</a:t>
-            </a:r>
-            <a:r>
-              <a:rPr lang="en-US" sz="2400" dirty="0">
-                <a:solidFill>
-                  <a:schemeClr val="bg1"/>
-                </a:solidFill>
+            <a:pPr marL="0" indent="0">
+              <a:spcBef>
+                <a:spcPts val="0"/>
+              </a:spcBef>
+              <a:spcAft>
+                <a:spcPts val="0"/>
+              </a:spcAft>
+              <a:buNone/>
+            </a:pPr>
+            <a:r>
+              <a:rPr lang="en-US" sz="2400" b="1" noProof="1">
+                <a:latin typeface="Consolas" pitchFamily="49" charset="0"/>
               </a:rPr>
-              <a:t>forEach</a:t>
-            </a:r>
-            <a:r>
-              <a:rPr lang="en-US" sz="2400" dirty="0"/>
-              <a:t>(x=&gt;words.</a:t>
-            </a:r>
-            <a:r>
-              <a:rPr lang="en-US" sz="2400" dirty="0">
-                <a:solidFill>
-                  <a:schemeClr val="bg1"/>
-                </a:solidFill>
+              <a:t>    matches.forEach(x =&gt; words.add(x.toLowerCase()));</a:t>
+            </a:r>
+          </a:p>
+          <a:p>
+            <a:pPr marL="0" indent="0">
+              <a:spcBef>
+                <a:spcPts val="0"/>
+              </a:spcBef>
+              <a:spcAft>
+                <a:spcPts val="0"/>
+              </a:spcAft>
+              <a:buNone/>
+            </a:pPr>
+            <a:r>
+              <a:rPr lang="en-US" sz="2400" b="1" noProof="1">
+                <a:latin typeface="Consolas" pitchFamily="49" charset="0"/>
               </a:rPr>
-              <a:t>add</a:t>
-            </a:r>
-            <a:r>
-              <a:rPr lang="en-US" sz="2400" dirty="0"/>
-              <a:t>(x.</a:t>
-            </a:r>
-            <a:r>
-              <a:rPr lang="en-US" sz="2400" dirty="0">
-                <a:solidFill>
-                  <a:schemeClr val="bg1"/>
-                </a:solidFill>
+              <a:t>  }</a:t>
+            </a:r>
+          </a:p>
+          <a:p>
+            <a:pPr marL="0" indent="0">
+              <a:spcBef>
+                <a:spcPts val="0"/>
+              </a:spcBef>
+              <a:spcAft>
+                <a:spcPts val="0"/>
+              </a:spcAft>
+              <a:buNone/>
+            </a:pPr>
+            <a:r>
+              <a:rPr lang="en-US" sz="2400" b="1" noProof="1">
+                <a:latin typeface="Consolas" pitchFamily="49" charset="0"/>
               </a:rPr>
-              <a:t>toLowerCase</a:t>
-            </a:r>
-            <a:r>
-              <a:rPr lang="en-US" sz="2400" dirty="0">
-                <a:solidFill>
-                  <a:schemeClr val="accent4"/>
-                </a:solidFill>
+              <a:t>  console.log([...words.values()].join(", "))^;</a:t>
+            </a:r>
+          </a:p>
+          <a:p>
+            <a:pPr marL="0" indent="0">
+              <a:spcBef>
+                <a:spcPts val="0"/>
+              </a:spcBef>
+              <a:spcAft>
+                <a:spcPts val="0"/>
+              </a:spcAft>
+              <a:buNone/>
+            </a:pPr>
+            <a:r>
+              <a:rPr lang="en-US" sz="2400" b="1" noProof="1">
+                <a:latin typeface="Consolas" pitchFamily="49" charset="0"/>
               </a:rPr>
-              <a:t>()</a:t>
-            </a:r>
-            <a:r>
-              <a:rPr lang="en-US" sz="2400" dirty="0"/>
-              <a:t>));</a:t>
-            </a:r>
-          </a:p>
-          <a:p>
-            <a:r>
-              <a:rPr lang="en-US" sz="2400" dirty="0"/>
-              <a:t>  }</a:t>
-            </a:r>
-          </a:p>
-          <a:p>
-            <a:r>
-              <a:rPr lang="en-US" sz="2400" dirty="0"/>
-              <a:t>  console.log([</a:t>
-            </a:r>
-            <a:r>
-              <a:rPr lang="bg-BG" sz="2400" dirty="0">
-                <a:solidFill>
-                  <a:schemeClr val="accent4"/>
-                </a:solidFill>
-              </a:rPr>
-              <a:t>...</a:t>
-            </a:r>
-            <a:r>
-              <a:rPr lang="en-US" sz="2400" dirty="0"/>
-              <a:t>words.</a:t>
-            </a:r>
-            <a:r>
-              <a:rPr lang="en-US" sz="2400" dirty="0">
-                <a:solidFill>
-                  <a:schemeClr val="bg1"/>
-                </a:solidFill>
-              </a:rPr>
-              <a:t>values()</a:t>
-            </a:r>
-            <a:r>
-              <a:rPr lang="en-US" sz="2400" dirty="0"/>
-              <a:t>].</a:t>
-            </a:r>
-            <a:r>
-              <a:rPr lang="en-US" sz="2400" dirty="0">
-                <a:solidFill>
-                  <a:schemeClr val="bg1"/>
-                </a:solidFill>
-              </a:rPr>
-              <a:t>join</a:t>
-            </a:r>
-            <a:r>
-              <a:rPr lang="en-US" sz="2400" dirty="0"/>
-              <a:t>(", "))^;</a:t>
-            </a:r>
-          </a:p>
-          <a:p>
-            <a:r>
-              <a:rPr lang="en-US" sz="2400" dirty="0"/>
               <a:t>}</a:t>
             </a:r>
           </a:p>
@@ -20024,199 +20049,210 @@
             <a:off x="2894935" y="2351677"/>
             <a:ext cx="6801517" cy="3668625"/>
           </a:xfrm>
+          <a:solidFill>
+            <a:schemeClr val="accent6">
+              <a:lumMod val="75000"/>
+              <a:alpha val="15000"/>
+            </a:schemeClr>
+          </a:solidFill>
+          <a:ln w="12700">
+            <a:solidFill>
+              <a:schemeClr val="tx1">
+                <a:lumMod val="50000"/>
+              </a:schemeClr>
+            </a:solidFill>
+          </a:ln>
         </p:spPr>
         <p:txBody>
-          <a:bodyPr wrap="square" lIns="144000">
+          <a:bodyPr vert="horz" wrap="square" lIns="144000" tIns="108000" rIns="144000" bIns="108000" rtlCol="0">
             <a:spAutoFit/>
           </a:bodyPr>
           <a:lstStyle/>
           <a:p>
-            <a:pPr>
-              <a:lnSpc>
-                <a:spcPct val="105000"/>
-              </a:lnSpc>
+            <a:pPr marL="0" indent="0">
               <a:spcBef>
                 <a:spcPts val="0"/>
               </a:spcBef>
+              <a:spcAft>
+                <a:spcPts val="0"/>
+              </a:spcAft>
+              <a:buNone/>
             </a:pPr>
             <a:r>
-              <a:rPr lang="en-US" sz="2400" dirty="0">
-                <a:solidFill>
-                  <a:schemeClr val="tx1"/>
-                </a:solidFill>
+              <a:rPr lang="en-US" sz="2400" b="1" dirty="0">
+                <a:latin typeface="Consolas" pitchFamily="49" charset="0"/>
               </a:rPr>
               <a:t>using System;</a:t>
             </a:r>
           </a:p>
           <a:p>
-            <a:pPr>
-              <a:lnSpc>
-                <a:spcPct val="105000"/>
-              </a:lnSpc>
+            <a:pPr marL="0" indent="0">
               <a:spcBef>
                 <a:spcPts val="0"/>
               </a:spcBef>
+              <a:spcAft>
+                <a:spcPts val="0"/>
+              </a:spcAft>
+              <a:buNone/>
             </a:pPr>
-            <a:endParaRPr lang="en-US" sz="2400" dirty="0">
-              <a:solidFill>
-                <a:schemeClr val="tx1"/>
-              </a:solidFill>
+            <a:endParaRPr lang="en-US" sz="2400" b="1" dirty="0">
+              <a:latin typeface="Consolas" pitchFamily="49" charset="0"/>
             </a:endParaRPr>
           </a:p>
           <a:p>
-            <a:pPr>
-              <a:lnSpc>
-                <a:spcPct val="105000"/>
-              </a:lnSpc>
+            <a:pPr marL="0" indent="0">
               <a:spcBef>
                 <a:spcPts val="0"/>
               </a:spcBef>
+              <a:spcAft>
+                <a:spcPts val="0"/>
+              </a:spcAft>
+              <a:buNone/>
             </a:pPr>
             <a:r>
-              <a:rPr lang="en-US" sz="2400" dirty="0">
-                <a:solidFill>
-                  <a:schemeClr val="tx1"/>
-                </a:solidFill>
+              <a:rPr lang="en-US" sz="2400" b="1" dirty="0">
+                <a:latin typeface="Consolas" pitchFamily="49" charset="0"/>
               </a:rPr>
               <a:t>class </a:t>
             </a:r>
             <a:r>
-              <a:rPr lang="en-US" sz="2400" dirty="0">
+              <a:rPr lang="en-US" sz="2400" b="1" dirty="0">
                 <a:solidFill>
                   <a:schemeClr val="bg1"/>
                 </a:solidFill>
+                <a:latin typeface="Consolas" pitchFamily="49" charset="0"/>
               </a:rPr>
               <a:t>HelloCSharp</a:t>
             </a:r>
           </a:p>
           <a:p>
-            <a:pPr>
-              <a:lnSpc>
-                <a:spcPct val="105000"/>
-              </a:lnSpc>
+            <a:pPr marL="0" indent="0">
               <a:spcBef>
                 <a:spcPts val="0"/>
               </a:spcBef>
+              <a:spcAft>
+                <a:spcPts val="0"/>
+              </a:spcAft>
+              <a:buNone/>
             </a:pPr>
             <a:r>
-              <a:rPr lang="en-US" sz="2400" dirty="0">
-                <a:solidFill>
-                  <a:schemeClr val="tx1"/>
-                </a:solidFill>
+              <a:rPr lang="en-US" sz="2400" b="1" dirty="0">
+                <a:latin typeface="Consolas" pitchFamily="49" charset="0"/>
               </a:rPr>
               <a:t>{</a:t>
             </a:r>
           </a:p>
           <a:p>
-            <a:pPr>
-              <a:lnSpc>
-                <a:spcPct val="105000"/>
-              </a:lnSpc>
+            <a:pPr marL="0" indent="0">
               <a:spcBef>
                 <a:spcPts val="0"/>
               </a:spcBef>
+              <a:spcAft>
+                <a:spcPts val="0"/>
+              </a:spcAft>
+              <a:buNone/>
             </a:pPr>
             <a:r>
-              <a:rPr lang="en-US" sz="2400" dirty="0">
-                <a:solidFill>
-                  <a:schemeClr val="tx1"/>
-                </a:solidFill>
+              <a:rPr lang="en-US" sz="2400" b="1" dirty="0">
+                <a:latin typeface="Consolas" pitchFamily="49" charset="0"/>
               </a:rPr>
               <a:t>  static void </a:t>
             </a:r>
             <a:r>
-              <a:rPr lang="en-US" sz="2400" dirty="0">
+              <a:rPr lang="en-US" sz="2400" b="1" dirty="0">
                 <a:solidFill>
                   <a:schemeClr val="bg1"/>
                 </a:solidFill>
+                <a:latin typeface="Consolas" pitchFamily="49" charset="0"/>
               </a:rPr>
-              <a:t>Main()</a:t>
-            </a:r>
-          </a:p>
-          <a:p>
-            <a:pPr>
-              <a:lnSpc>
-                <a:spcPct val="105000"/>
-              </a:lnSpc>
+              <a:t>Main</a:t>
+            </a:r>
+            <a:r>
+              <a:rPr lang="en-US" sz="2400" b="1" dirty="0">
+                <a:latin typeface="Consolas" pitchFamily="49" charset="0"/>
+              </a:rPr>
+              <a:t>()</a:t>
+            </a:r>
+          </a:p>
+          <a:p>
+            <a:pPr marL="0" indent="0">
               <a:spcBef>
                 <a:spcPts val="0"/>
               </a:spcBef>
+              <a:spcAft>
+                <a:spcPts val="0"/>
+              </a:spcAft>
+              <a:buNone/>
             </a:pPr>
             <a:r>
-              <a:rPr lang="en-US" sz="2400" dirty="0">
-                <a:solidFill>
-                  <a:schemeClr val="tx1"/>
-                </a:solidFill>
+              <a:rPr lang="en-US" sz="2400" b="1" dirty="0">
+                <a:latin typeface="Consolas" pitchFamily="49" charset="0"/>
               </a:rPr>
               <a:t>    {</a:t>
             </a:r>
           </a:p>
           <a:p>
-            <a:pPr>
-              <a:lnSpc>
-                <a:spcPct val="105000"/>
-              </a:lnSpc>
+            <a:pPr marL="0" indent="0">
               <a:spcBef>
                 <a:spcPts val="0"/>
               </a:spcBef>
+              <a:spcAft>
+                <a:spcPts val="0"/>
+              </a:spcAft>
+              <a:buNone/>
             </a:pPr>
             <a:r>
-              <a:rPr lang="en-US" sz="2400" dirty="0">
-                <a:solidFill>
-                  <a:schemeClr val="tx1"/>
-                </a:solidFill>
+              <a:rPr lang="en-US" sz="2400" b="1" dirty="0">
+                <a:latin typeface="Consolas" pitchFamily="49" charset="0"/>
               </a:rPr>
               <a:t>      Console.</a:t>
             </a:r>
             <a:r>
-              <a:rPr lang="en-US" sz="2400" dirty="0">
+              <a:rPr lang="en-US" sz="2400" b="1" dirty="0">
                 <a:solidFill>
                   <a:schemeClr val="bg1"/>
                 </a:solidFill>
+                <a:latin typeface="Consolas" pitchFamily="49" charset="0"/>
               </a:rPr>
               <a:t>WriteLine</a:t>
             </a:r>
             <a:r>
-              <a:rPr lang="en-US" sz="2400" dirty="0">
-                <a:solidFill>
-                  <a:schemeClr val="tx1"/>
-                </a:solidFill>
+              <a:rPr lang="en-US" sz="2400" b="1" dirty="0">
+                <a:latin typeface="Consolas" pitchFamily="49" charset="0"/>
               </a:rPr>
               <a:t>("Hello, C#");</a:t>
             </a:r>
           </a:p>
           <a:p>
-            <a:pPr>
-              <a:lnSpc>
-                <a:spcPct val="105000"/>
-              </a:lnSpc>
+            <a:pPr marL="0" indent="0">
               <a:spcBef>
                 <a:spcPts val="0"/>
               </a:spcBef>
+              <a:spcAft>
+                <a:spcPts val="0"/>
+              </a:spcAft>
+              <a:buNone/>
             </a:pPr>
             <a:r>
-              <a:rPr lang="en-US" sz="2400" dirty="0">
-                <a:solidFill>
-                  <a:schemeClr val="tx1"/>
-                </a:solidFill>
+              <a:rPr lang="en-US" sz="2400" b="1" dirty="0">
+                <a:latin typeface="Consolas" pitchFamily="49" charset="0"/>
               </a:rPr>
               <a:t>    }</a:t>
             </a:r>
           </a:p>
           <a:p>
-            <a:pPr>
-              <a:lnSpc>
-                <a:spcPct val="105000"/>
-              </a:lnSpc>
+            <a:pPr marL="0" indent="0">
               <a:spcBef>
                 <a:spcPts val="0"/>
               </a:spcBef>
+              <a:spcAft>
+                <a:spcPts val="0"/>
+              </a:spcAft>
+              <a:buNone/>
             </a:pPr>
             <a:r>
-              <a:rPr lang="en-US" sz="2400" dirty="0">
-                <a:solidFill>
-                  <a:schemeClr val="tx1"/>
-                </a:solidFill>
+              <a:rPr lang="en-US" sz="2400" b="1" dirty="0">
+                <a:latin typeface="Consolas" pitchFamily="49" charset="0"/>
               </a:rPr>
               <a:t>}</a:t>
             </a:r>
@@ -21815,12 +21851,7 @@
             <p:ph type="title"/>
           </p:nvPr>
         </p:nvSpPr>
-        <p:spPr>
-          <a:xfrm>
-            <a:off x="190405" y="100750"/>
-            <a:ext cx="9669213" cy="882654"/>
-          </a:xfrm>
-        </p:spPr>
+        <p:spPr/>
         <p:txBody>
           <a:bodyPr/>
           <a:lstStyle/>
@@ -23888,6 +23919,176 @@
       </p:pic>
       <p:sp>
         <p:nvSpPr>
+          <p:cNvPr id="14" name="Text Placeholder Body">
+            <a:extLst>
+              <a:ext uri="{FF2B5EF4-FFF2-40B4-BE49-F238E27FC236}">
+                <a16:creationId xmlns:a16="http://schemas.microsoft.com/office/drawing/2014/main" id="{0E49D336-45B6-44D3-97C4-E28F8DEA2022}"/>
+              </a:ext>
+            </a:extLst>
+          </p:cNvPr>
+          <p:cNvSpPr>
+            <a:spLocks noGrp="1"/>
+          </p:cNvSpPr>
+          <p:nvPr>
+            <p:ph type="body" sz="quarter" idx="10"/>
+          </p:nvPr>
+        </p:nvSpPr>
+        <p:spPr>
+          <a:xfrm>
+            <a:off x="697878" y="1676785"/>
+            <a:ext cx="8446247" cy="4681077"/>
+          </a:xfrm>
+        </p:spPr>
+        <p:txBody>
+          <a:bodyPr/>
+          <a:lstStyle>
+            <a:lvl1pPr marL="514350" indent="-514350">
+              <a:buFont typeface="Wingdings" panose="05000000000000000000" pitchFamily="2" charset="2"/>
+              <a:buChar char="§"/>
+              <a:defRPr>
+                <a:solidFill>
+                  <a:schemeClr val="bg2"/>
+                </a:solidFill>
+              </a:defRPr>
+            </a:lvl1pPr>
+            <a:lvl2pPr marL="1123935" indent="-514350">
+              <a:buFont typeface="Wingdings" panose="05000000000000000000" pitchFamily="2" charset="2"/>
+              <a:buChar char="§"/>
+              <a:defRPr>
+                <a:solidFill>
+                  <a:schemeClr val="tx1"/>
+                </a:solidFill>
+              </a:defRPr>
+            </a:lvl2pPr>
+            <a:lvl3pPr marL="1733520" indent="-514350">
+              <a:buFont typeface="Wingdings" panose="05000000000000000000" pitchFamily="2" charset="2"/>
+              <a:buChar char="§"/>
+              <a:defRPr>
+                <a:solidFill>
+                  <a:schemeClr val="tx1"/>
+                </a:solidFill>
+              </a:defRPr>
+            </a:lvl3pPr>
+            <a:lvl4pPr marL="2343105" indent="-514350">
+              <a:buFont typeface="Wingdings" panose="05000000000000000000" pitchFamily="2" charset="2"/>
+              <a:buChar char="§"/>
+              <a:defRPr>
+                <a:solidFill>
+                  <a:schemeClr val="tx1"/>
+                </a:solidFill>
+              </a:defRPr>
+            </a:lvl4pPr>
+            <a:lvl5pPr marL="2952689" indent="-514350">
+              <a:buFont typeface="Wingdings" panose="05000000000000000000" pitchFamily="2" charset="2"/>
+              <a:buChar char="§"/>
+              <a:defRPr>
+                <a:solidFill>
+                  <a:schemeClr val="tx1"/>
+                </a:solidFill>
+              </a:defRPr>
+            </a:lvl5pPr>
+          </a:lstStyle>
+          <a:p>
+            <a:pPr marL="452438" lvl="0" indent="-452438"/>
+            <a:r>
+              <a:rPr lang="en-US" dirty="0"/>
+              <a:t>Objects in JS hold key value pairs</a:t>
+            </a:r>
+          </a:p>
+          <a:p>
+            <a:pPr marL="452438" lvl="0" indent="-452438">
+              <a:buClr>
+                <a:schemeClr val="bg2"/>
+              </a:buClr>
+            </a:pPr>
+            <a:r>
+              <a:rPr lang="en-US" b="1" dirty="0">
+                <a:solidFill>
+                  <a:schemeClr val="bg1">
+                    <a:lumMod val="60000"/>
+                    <a:lumOff val="40000"/>
+                  </a:schemeClr>
+                </a:solidFill>
+              </a:rPr>
+              <a:t>Maps</a:t>
+            </a:r>
+            <a:r>
+              <a:rPr lang="en-US" dirty="0"/>
+              <a:t> map keys to values, preserves key order</a:t>
+            </a:r>
+          </a:p>
+          <a:p>
+            <a:pPr marL="452438" lvl="0" indent="-452438"/>
+            <a:endParaRPr lang="en-US" dirty="0"/>
+          </a:p>
+          <a:p>
+            <a:pPr marL="452438" lvl="0" indent="-452438"/>
+            <a:endParaRPr lang="en-US" dirty="0"/>
+          </a:p>
+          <a:p>
+            <a:pPr marL="452438" lvl="0" indent="-452438">
+              <a:lnSpc>
+                <a:spcPct val="110000"/>
+              </a:lnSpc>
+              <a:spcBef>
+                <a:spcPts val="1200"/>
+              </a:spcBef>
+              <a:buClr>
+                <a:schemeClr val="bg2"/>
+              </a:buClr>
+            </a:pPr>
+            <a:r>
+              <a:rPr lang="en-US" b="1" dirty="0">
+                <a:solidFill>
+                  <a:schemeClr val="bg1">
+                    <a:lumMod val="60000"/>
+                    <a:lumOff val="40000"/>
+                  </a:schemeClr>
+                </a:solidFill>
+              </a:rPr>
+              <a:t>Sets</a:t>
+            </a:r>
+            <a:r>
+              <a:rPr lang="en-US" dirty="0"/>
+              <a:t> hold unique collection of values</a:t>
+            </a:r>
+          </a:p>
+          <a:p>
+            <a:pPr marL="452438" lvl="0" indent="-452438">
+              <a:buClr>
+                <a:schemeClr val="bg2"/>
+              </a:buClr>
+            </a:pPr>
+            <a:endParaRPr lang="en-US" dirty="0"/>
+          </a:p>
+        </p:txBody>
+      </p:sp>
+      <p:sp>
+        <p:nvSpPr>
+          <p:cNvPr id="4" name="Slide Title"/>
+          <p:cNvSpPr>
+            <a:spLocks noGrp="1"/>
+          </p:cNvSpPr>
+          <p:nvPr>
+            <p:ph type="title"/>
+          </p:nvPr>
+        </p:nvSpPr>
+        <p:spPr/>
+        <p:txBody>
+          <a:bodyPr>
+            <a:normAutofit/>
+          </a:bodyPr>
+          <a:lstStyle/>
+          <a:p>
+            <a:r>
+              <a:rPr lang="en-US" dirty="0"/>
+              <a:t>Summary</a:t>
+            </a:r>
+          </a:p>
+        </p:txBody>
+      </p:sp>
+      <p:sp>
+        <p:nvSpPr>
           <p:cNvPr id="16" name="Text Placeholder Code Box">
             <a:extLst>
               <a:ext uri="{FF2B5EF4-FFF2-40B4-BE49-F238E27FC236}">
@@ -24048,7 +24249,10 @@
             <a:r>
               <a:rPr lang="en-US" dirty="0">
                 <a:solidFill>
-                  <a:schemeClr val="bg1"/>
+                  <a:schemeClr val="bg1">
+                    <a:lumMod val="60000"/>
+                    <a:lumOff val="40000"/>
+                  </a:schemeClr>
                 </a:solidFill>
               </a:rPr>
               <a:t>new Set()</a:t>
@@ -24064,7 +24268,10 @@
             <a:r>
               <a:rPr lang="en-US" dirty="0">
                 <a:solidFill>
-                  <a:schemeClr val="bg1"/>
+                  <a:schemeClr val="bg1">
+                    <a:lumMod val="60000"/>
+                    <a:lumOff val="40000"/>
+                  </a:schemeClr>
                 </a:solidFill>
               </a:rPr>
               <a:t>add</a:t>
@@ -24247,10 +24454,21 @@
             <a:r>
               <a:rPr lang="en-US" dirty="0">
                 <a:solidFill>
+                  <a:schemeClr val="bg1">
+                    <a:lumMod val="60000"/>
+                    <a:lumOff val="40000"/>
+                  </a:schemeClr>
+                </a:solidFill>
+              </a:rPr>
+              <a:t>{</a:t>
+            </a:r>
+            <a:r>
+              <a:rPr lang="en-US" dirty="0">
+                <a:solidFill>
                   <a:schemeClr val="bg1"/>
                 </a:solidFill>
               </a:rPr>
-              <a:t>{ </a:t>
+              <a:t> </a:t>
             </a:r>
             <a:r>
               <a:rPr lang="en-US" dirty="0">
@@ -24263,7 +24481,10 @@
             <a:r>
               <a:rPr lang="en-US" dirty="0">
                 <a:solidFill>
-                  <a:schemeClr val="bg1"/>
+                  <a:schemeClr val="bg1">
+                    <a:lumMod val="60000"/>
+                    <a:lumOff val="40000"/>
+                  </a:schemeClr>
                 </a:solidFill>
               </a:rPr>
               <a:t>};</a:t>
@@ -24283,7 +24504,10 @@
             <a:r>
               <a:rPr lang="en-US" dirty="0">
                 <a:solidFill>
-                  <a:schemeClr val="bg1"/>
+                  <a:schemeClr val="bg1">
+                    <a:lumMod val="60000"/>
+                    <a:lumOff val="40000"/>
+                  </a:schemeClr>
                 </a:solidFill>
               </a:rPr>
               <a:t>delete</a:t>
@@ -24295,170 +24519,6 @@
                 </a:solidFill>
               </a:rPr>
               <a:t> obj.name;</a:t>
-            </a:r>
-          </a:p>
-        </p:txBody>
-      </p:sp>
-      <p:sp>
-        <p:nvSpPr>
-          <p:cNvPr id="14" name="Text Placeholder Body">
-            <a:extLst>
-              <a:ext uri="{FF2B5EF4-FFF2-40B4-BE49-F238E27FC236}">
-                <a16:creationId xmlns:a16="http://schemas.microsoft.com/office/drawing/2014/main" id="{0E49D336-45B6-44D3-97C4-E28F8DEA2022}"/>
-              </a:ext>
-            </a:extLst>
-          </p:cNvPr>
-          <p:cNvSpPr>
-            <a:spLocks noGrp="1"/>
-          </p:cNvSpPr>
-          <p:nvPr>
-            <p:ph type="body" sz="quarter" idx="10"/>
-          </p:nvPr>
-        </p:nvSpPr>
-        <p:spPr>
-          <a:xfrm>
-            <a:off x="697878" y="1676785"/>
-            <a:ext cx="8446247" cy="4681077"/>
-          </a:xfrm>
-        </p:spPr>
-        <p:txBody>
-          <a:bodyPr/>
-          <a:lstStyle>
-            <a:lvl1pPr marL="514350" indent="-514350">
-              <a:buFont typeface="Wingdings" panose="05000000000000000000" pitchFamily="2" charset="2"/>
-              <a:buChar char="§"/>
-              <a:defRPr>
-                <a:solidFill>
-                  <a:schemeClr val="bg2"/>
-                </a:solidFill>
-              </a:defRPr>
-            </a:lvl1pPr>
-            <a:lvl2pPr marL="1123935" indent="-514350">
-              <a:buFont typeface="Wingdings" panose="05000000000000000000" pitchFamily="2" charset="2"/>
-              <a:buChar char="§"/>
-              <a:defRPr>
-                <a:solidFill>
-                  <a:schemeClr val="tx1"/>
-                </a:solidFill>
-              </a:defRPr>
-            </a:lvl2pPr>
-            <a:lvl3pPr marL="1733520" indent="-514350">
-              <a:buFont typeface="Wingdings" panose="05000000000000000000" pitchFamily="2" charset="2"/>
-              <a:buChar char="§"/>
-              <a:defRPr>
-                <a:solidFill>
-                  <a:schemeClr val="tx1"/>
-                </a:solidFill>
-              </a:defRPr>
-            </a:lvl3pPr>
-            <a:lvl4pPr marL="2343105" indent="-514350">
-              <a:buFont typeface="Wingdings" panose="05000000000000000000" pitchFamily="2" charset="2"/>
-              <a:buChar char="§"/>
-              <a:defRPr>
-                <a:solidFill>
-                  <a:schemeClr val="tx1"/>
-                </a:solidFill>
-              </a:defRPr>
-            </a:lvl4pPr>
-            <a:lvl5pPr marL="2952689" indent="-514350">
-              <a:buFont typeface="Wingdings" panose="05000000000000000000" pitchFamily="2" charset="2"/>
-              <a:buChar char="§"/>
-              <a:defRPr>
-                <a:solidFill>
-                  <a:schemeClr val="tx1"/>
-                </a:solidFill>
-              </a:defRPr>
-            </a:lvl5pPr>
-          </a:lstStyle>
-          <a:p>
-            <a:pPr marL="452438" lvl="0" indent="-452438"/>
-            <a:r>
-              <a:rPr lang="en-US" dirty="0"/>
-              <a:t>Objects in JS hold key value pairs</a:t>
-            </a:r>
-          </a:p>
-          <a:p>
-            <a:pPr marL="452438" lvl="0" indent="-452438">
-              <a:buClr>
-                <a:schemeClr val="bg2"/>
-              </a:buClr>
-            </a:pPr>
-            <a:r>
-              <a:rPr lang="en-US" dirty="0">
-                <a:solidFill>
-                  <a:schemeClr val="bg1"/>
-                </a:solidFill>
-              </a:rPr>
-              <a:t>Maps</a:t>
-            </a:r>
-            <a:r>
-              <a:rPr lang="en-US" dirty="0"/>
-              <a:t> map keys to values, preserves key order</a:t>
-            </a:r>
-          </a:p>
-          <a:p>
-            <a:pPr marL="452438" lvl="0" indent="-452438"/>
-            <a:endParaRPr lang="en-US" dirty="0"/>
-          </a:p>
-          <a:p>
-            <a:pPr marL="452438" lvl="0" indent="-452438"/>
-            <a:endParaRPr lang="en-US" dirty="0"/>
-          </a:p>
-          <a:p>
-            <a:pPr marL="452438" lvl="0" indent="-452438">
-              <a:lnSpc>
-                <a:spcPct val="110000"/>
-              </a:lnSpc>
-              <a:spcBef>
-                <a:spcPts val="1200"/>
-              </a:spcBef>
-              <a:buClr>
-                <a:schemeClr val="bg2"/>
-              </a:buClr>
-            </a:pPr>
-            <a:r>
-              <a:rPr lang="en-US" dirty="0">
-                <a:solidFill>
-                  <a:schemeClr val="bg1"/>
-                </a:solidFill>
-              </a:rPr>
-              <a:t>Sets</a:t>
-            </a:r>
-            <a:r>
-              <a:rPr lang="en-US" dirty="0"/>
-              <a:t> hold unique collection of values</a:t>
-            </a:r>
-          </a:p>
-          <a:p>
-            <a:pPr marL="452438" lvl="0" indent="-452438">
-              <a:buClr>
-                <a:schemeClr val="bg2"/>
-              </a:buClr>
-            </a:pPr>
-            <a:endParaRPr lang="en-US" dirty="0"/>
-          </a:p>
-        </p:txBody>
-      </p:sp>
-      <p:sp>
-        <p:nvSpPr>
-          <p:cNvPr id="4" name="Slide Title"/>
-          <p:cNvSpPr>
-            <a:spLocks noGrp="1"/>
-          </p:cNvSpPr>
-          <p:nvPr>
-            <p:ph type="title"/>
-          </p:nvPr>
-        </p:nvSpPr>
-        <p:spPr/>
-        <p:txBody>
-          <a:bodyPr>
-            <a:normAutofit/>
-          </a:bodyPr>
-          <a:lstStyle/>
-          <a:p>
-            <a:r>
-              <a:rPr lang="en-US" dirty="0"/>
-              <a:t>Summary</a:t>
             </a:r>
           </a:p>
         </p:txBody>
@@ -25796,7 +25856,7 @@
               <a:t>Short explanation of the </a:t>
             </a:r>
             <a:r>
-              <a:rPr lang="en-US" dirty="0">
+              <a:rPr lang="en-US" b="1" dirty="0">
                 <a:solidFill>
                   <a:schemeClr val="accent1"/>
                 </a:solidFill>
@@ -25815,14 +25875,14 @@
               <a:t>Keep slide content </a:t>
             </a:r>
             <a:r>
-              <a:rPr lang="en-US" dirty="0">
+              <a:rPr lang="en-US" b="1" dirty="0">
                 <a:solidFill>
                   <a:schemeClr val="accent1"/>
                 </a:solidFill>
               </a:rPr>
               <a:t>centered</a:t>
             </a:r>
-            <a:endParaRPr lang="en-US" dirty="0"/>
+            <a:endParaRPr lang="en-US" b="1" dirty="0"/>
           </a:p>
         </p:txBody>
       </p:sp>

</xml_diff>